<commit_message>
Updated breakout timing slides
</commit_message>
<xml_diff>
--- a/presentations/Day_1_breakout.pptx
+++ b/presentations/Day_1_breakout.pptx
@@ -8264,10 +8264,10 @@
       </p:grpSpPr>
       <p:pic>
         <p:nvPicPr>
-          <p:cNvPr id="5" name="Picture 4" descr="Graphical user interface, text, application&#10;&#10;Description automatically generated">
-            <a:extLst>
-              <a:ext uri="{FF2B5EF4-FFF2-40B4-BE49-F238E27FC236}">
-                <a16:creationId xmlns:a16="http://schemas.microsoft.com/office/drawing/2014/main" id="{56852908-C3DA-AC76-D3FD-1737FA0F1BE9}"/>
+          <p:cNvPr id="6" name="Picture 5" descr="Graphical user interface, text, application&#10;&#10;Description automatically generated">
+            <a:extLst>
+              <a:ext uri="{FF2B5EF4-FFF2-40B4-BE49-F238E27FC236}">
+                <a16:creationId xmlns:a16="http://schemas.microsoft.com/office/drawing/2014/main" id="{72DAECC4-EC5F-FDC9-E0CF-AF1E287DEDD2}"/>
               </a:ext>
             </a:extLst>
           </p:cNvPr>
@@ -8290,8 +8290,8 @@
         </p:blipFill>
         <p:spPr>
           <a:xfrm>
-            <a:off x="480150" y="1573215"/>
-            <a:ext cx="11344027" cy="3967827"/>
+            <a:off x="361526" y="1633939"/>
+            <a:ext cx="11468947" cy="3966704"/>
           </a:xfrm>
           <a:prstGeom prst="rect">
             <a:avLst/>
@@ -11337,10 +11337,10 @@
       </p:grpSpPr>
       <p:pic>
         <p:nvPicPr>
-          <p:cNvPr id="5" name="Picture 4">
-            <a:extLst>
-              <a:ext uri="{FF2B5EF4-FFF2-40B4-BE49-F238E27FC236}">
-                <a16:creationId xmlns:a16="http://schemas.microsoft.com/office/drawing/2014/main" id="{995300C0-D3D6-D75C-7C38-8156F8E2AE86}"/>
+          <p:cNvPr id="7" name="Picture 6" descr="Graphical user interface, text, application&#10;&#10;Description automatically generated">
+            <a:extLst>
+              <a:ext uri="{FF2B5EF4-FFF2-40B4-BE49-F238E27FC236}">
+                <a16:creationId xmlns:a16="http://schemas.microsoft.com/office/drawing/2014/main" id="{B5AE5156-A6C7-52BD-F1C8-6028CCA1310D}"/>
               </a:ext>
             </a:extLst>
           </p:cNvPr>
@@ -11363,8 +11363,8 @@
         </p:blipFill>
         <p:spPr>
           <a:xfrm>
-            <a:off x="278459" y="1716458"/>
-            <a:ext cx="11663800" cy="3425084"/>
+            <a:off x="284436" y="1716458"/>
+            <a:ext cx="11623128" cy="3425084"/>
           </a:xfrm>
           <a:prstGeom prst="rect">
             <a:avLst/>
@@ -11436,42 +11436,6 @@
           </a:p>
         </p:txBody>
       </p:sp>
-      <p:pic>
-        <p:nvPicPr>
-          <p:cNvPr id="6" name="Picture 5" descr="Graphical user interface, text, application&#10;&#10;Description automatically generated">
-            <a:extLst>
-              <a:ext uri="{FF2B5EF4-FFF2-40B4-BE49-F238E27FC236}">
-                <a16:creationId xmlns:a16="http://schemas.microsoft.com/office/drawing/2014/main" id="{CC2D3DDF-6A07-B78C-45A3-B151CBD1AA68}"/>
-              </a:ext>
-            </a:extLst>
-          </p:cNvPr>
-          <p:cNvPicPr>
-            <a:picLocks noChangeAspect="1"/>
-          </p:cNvPicPr>
-          <p:nvPr/>
-        </p:nvPicPr>
-        <p:blipFill>
-          <a:blip r:embed="rId3">
-            <a:extLst>
-              <a:ext uri="{28A0092B-C50C-407E-A947-70E740481C1C}">
-                <a14:useLocalDpi xmlns:a14="http://schemas.microsoft.com/office/drawing/2010/main" val="0"/>
-              </a:ext>
-            </a:extLst>
-          </a:blip>
-          <a:stretch>
-            <a:fillRect/>
-          </a:stretch>
-        </p:blipFill>
-        <p:spPr>
-          <a:xfrm>
-            <a:off x="328089" y="2457962"/>
-            <a:ext cx="11695356" cy="2725494"/>
-          </a:xfrm>
-          <a:prstGeom prst="rect">
-            <a:avLst/>
-          </a:prstGeom>
-        </p:spPr>
-      </p:pic>
     </p:spTree>
     <p:extLst>
       <p:ext uri="{BB962C8B-B14F-4D97-AF65-F5344CB8AC3E}">
@@ -11504,10 +11468,10 @@
       </p:grpSpPr>
       <p:pic>
         <p:nvPicPr>
-          <p:cNvPr id="9" name="Picture 8" descr="Text&#10;&#10;Description automatically generated">
-            <a:extLst>
-              <a:ext uri="{FF2B5EF4-FFF2-40B4-BE49-F238E27FC236}">
-                <a16:creationId xmlns:a16="http://schemas.microsoft.com/office/drawing/2014/main" id="{A86D9840-3C31-B627-F712-43283BFA9060}"/>
+          <p:cNvPr id="6" name="Picture 5" descr="Graphical user interface, text&#10;&#10;Description automatically generated">
+            <a:extLst>
+              <a:ext uri="{FF2B5EF4-FFF2-40B4-BE49-F238E27FC236}">
+                <a16:creationId xmlns:a16="http://schemas.microsoft.com/office/drawing/2014/main" id="{BB92A0B9-208C-9D86-951D-09C021F9673D}"/>
               </a:ext>
             </a:extLst>
           </p:cNvPr>
@@ -11518,6 +11482,42 @@
         </p:nvPicPr>
         <p:blipFill>
           <a:blip r:embed="rId2">
+            <a:extLst>
+              <a:ext uri="{28A0092B-C50C-407E-A947-70E740481C1C}">
+                <a14:useLocalDpi xmlns:a14="http://schemas.microsoft.com/office/drawing/2010/main" val="0"/>
+              </a:ext>
+            </a:extLst>
+          </a:blip>
+          <a:stretch>
+            <a:fillRect/>
+          </a:stretch>
+        </p:blipFill>
+        <p:spPr>
+          <a:xfrm>
+            <a:off x="920395" y="1092737"/>
+            <a:ext cx="6889077" cy="967824"/>
+          </a:xfrm>
+          <a:prstGeom prst="rect">
+            <a:avLst/>
+          </a:prstGeom>
+        </p:spPr>
+      </p:pic>
+      <p:pic>
+        <p:nvPicPr>
+          <p:cNvPr id="9" name="Picture 8" descr="Text&#10;&#10;Description automatically generated">
+            <a:extLst>
+              <a:ext uri="{FF2B5EF4-FFF2-40B4-BE49-F238E27FC236}">
+                <a16:creationId xmlns:a16="http://schemas.microsoft.com/office/drawing/2014/main" id="{A86D9840-3C31-B627-F712-43283BFA9060}"/>
+              </a:ext>
+            </a:extLst>
+          </p:cNvPr>
+          <p:cNvPicPr>
+            <a:picLocks noChangeAspect="1"/>
+          </p:cNvPicPr>
+          <p:nvPr/>
+        </p:nvPicPr>
+        <p:blipFill>
+          <a:blip r:embed="rId3">
             <a:extLst>
               <a:ext uri="{28A0092B-C50C-407E-A947-70E740481C1C}">
                 <a14:useLocalDpi xmlns:a14="http://schemas.microsoft.com/office/drawing/2010/main" val="0"/>
@@ -11532,42 +11532,6 @@
           <a:xfrm>
             <a:off x="1004371" y="3428403"/>
             <a:ext cx="5506333" cy="1414273"/>
-          </a:xfrm>
-          <a:prstGeom prst="rect">
-            <a:avLst/>
-          </a:prstGeom>
-        </p:spPr>
-      </p:pic>
-      <p:pic>
-        <p:nvPicPr>
-          <p:cNvPr id="3" name="Picture 2" descr="Graphical user interface, text, application, Word&#10;&#10;Description automatically generated">
-            <a:extLst>
-              <a:ext uri="{FF2B5EF4-FFF2-40B4-BE49-F238E27FC236}">
-                <a16:creationId xmlns:a16="http://schemas.microsoft.com/office/drawing/2014/main" id="{D0999234-569A-192E-0ACA-726449AC7137}"/>
-              </a:ext>
-            </a:extLst>
-          </p:cNvPr>
-          <p:cNvPicPr>
-            <a:picLocks noChangeAspect="1"/>
-          </p:cNvPicPr>
-          <p:nvPr/>
-        </p:nvPicPr>
-        <p:blipFill>
-          <a:blip r:embed="rId3">
-            <a:extLst>
-              <a:ext uri="{28A0092B-C50C-407E-A947-70E740481C1C}">
-                <a14:useLocalDpi xmlns:a14="http://schemas.microsoft.com/office/drawing/2010/main" val="0"/>
-              </a:ext>
-            </a:extLst>
-          </a:blip>
-          <a:stretch>
-            <a:fillRect/>
-          </a:stretch>
-        </p:blipFill>
-        <p:spPr>
-          <a:xfrm>
-            <a:off x="920395" y="1071824"/>
-            <a:ext cx="6774767" cy="967824"/>
           </a:xfrm>
           <a:prstGeom prst="rect">
             <a:avLst/>
@@ -12849,15 +12813,6 @@
 </file>
 
 <file path=customXml/item1.xml><?xml version="1.0" encoding="utf-8"?>
-<?mso-contentType ?>
-<FormTemplates xmlns="http://schemas.microsoft.com/sharepoint/v3/contenttype/forms">
-  <Display>DocumentLibraryForm</Display>
-  <Edit>DocumentLibraryForm</Edit>
-  <New>DocumentLibraryForm</New>
-</FormTemplates>
-</file>
-
-<file path=customXml/item2.xml><?xml version="1.0" encoding="utf-8"?>
 <ct:contentTypeSchema xmlns:ct="http://schemas.microsoft.com/office/2006/metadata/contentType" xmlns:ma="http://schemas.microsoft.com/office/2006/metadata/properties/metaAttributes" ct:_="" ma:_="" ma:contentTypeName="Document" ma:contentTypeID="0x010100243BF64BC0C0BF44B4C14F29ACF2ADFE" ma:contentTypeVersion="13" ma:contentTypeDescription="Create a new document." ma:contentTypeScope="" ma:versionID="d2eb8cac4b9bdcdf940edbad4be5ffb9">
   <xsd:schema xmlns:xsd="http://www.w3.org/2001/XMLSchema" xmlns:xs="http://www.w3.org/2001/XMLSchema" xmlns:p="http://schemas.microsoft.com/office/2006/metadata/properties" xmlns:ns3="617caac6-e32b-43f4-b15f-9e19ce02f2c4" xmlns:ns4="ed9eba1e-de0f-47f1-af31-795f0b67a61e" targetNamespace="http://schemas.microsoft.com/office/2006/metadata/properties" ma:root="true" ma:fieldsID="f209d1f0dddf54f43dda48f447945c47" ns3:_="" ns4:_="">
     <xsd:import namespace="617caac6-e32b-43f4-b15f-9e19ce02f2c4"/>
@@ -13080,6 +13035,15 @@
 </ct:contentTypeSchema>
 </file>
 
+<file path=customXml/item2.xml><?xml version="1.0" encoding="utf-8"?>
+<?mso-contentType ?>
+<FormTemplates xmlns="http://schemas.microsoft.com/sharepoint/v3/contenttype/forms">
+  <Display>DocumentLibraryForm</Display>
+  <Edit>DocumentLibraryForm</Edit>
+  <New>DocumentLibraryForm</New>
+</FormTemplates>
+</file>
+
 <file path=customXml/item3.xml><?xml version="1.0" encoding="utf-8"?>
 <p:properties xmlns:p="http://schemas.microsoft.com/office/2006/metadata/properties" xmlns:xsi="http://www.w3.org/2001/XMLSchema-instance" xmlns:pc="http://schemas.microsoft.com/office/infopath/2007/PartnerControls">
   <documentManagement/>
@@ -13087,14 +13051,6 @@
 </file>
 
 <file path=customXml/itemProps1.xml><?xml version="1.0" encoding="utf-8"?>
-<ds:datastoreItem xmlns:ds="http://schemas.openxmlformats.org/officeDocument/2006/customXml" ds:itemID="{B257E757-C7A0-48C9-A01A-9A8F3C9BFA95}">
-  <ds:schemaRefs>
-    <ds:schemaRef ds:uri="http://schemas.microsoft.com/sharepoint/v3/contenttype/forms"/>
-  </ds:schemaRefs>
-</ds:datastoreItem>
-</file>
-
-<file path=customXml/itemProps2.xml><?xml version="1.0" encoding="utf-8"?>
 <ds:datastoreItem xmlns:ds="http://schemas.openxmlformats.org/officeDocument/2006/customXml" ds:itemID="{6B7558EF-A25E-4404-BE20-95EB7F0D4D5C}">
   <ds:schemaRefs>
     <ds:schemaRef ds:uri="http://schemas.microsoft.com/office/2006/metadata/contentType"/>
@@ -13113,6 +13069,14 @@
 </ds:datastoreItem>
 </file>
 
+<file path=customXml/itemProps2.xml><?xml version="1.0" encoding="utf-8"?>
+<ds:datastoreItem xmlns:ds="http://schemas.openxmlformats.org/officeDocument/2006/customXml" ds:itemID="{B257E757-C7A0-48C9-A01A-9A8F3C9BFA95}">
+  <ds:schemaRefs>
+    <ds:schemaRef ds:uri="http://schemas.microsoft.com/sharepoint/v3/contenttype/forms"/>
+  </ds:schemaRefs>
+</ds:datastoreItem>
+</file>
+
 <file path=customXml/itemProps3.xml><?xml version="1.0" encoding="utf-8"?>
 <ds:datastoreItem xmlns:ds="http://schemas.openxmlformats.org/officeDocument/2006/customXml" ds:itemID="{C8BC563B-386C-426F-9B78-8203DC9D25ED}">
   <ds:schemaRefs>

</xml_diff>